<commit_message>
Update session 18 documents.
</commit_message>
<xml_diff>
--- a/CPSC-24700/Presentations/session-18.pptx
+++ b/CPSC-24700/Presentations/session-18.pptx
@@ -120,6 +120,10 @@
 </p:presentation>
 </file>
 
+<file path=ppt/revisionInfo.xml><?xml version="1.0" encoding="utf-8"?>
+<p1510:revInfo xmlns:a="http://schemas.openxmlformats.org/drawingml/2006/main" xmlns:r="http://schemas.openxmlformats.org/officeDocument/2006/relationships" xmlns:p1510="http://schemas.microsoft.com/office/powerpoint/2015/10/main"/>
+</file>
+
 <file path=ppt/notesMasters/notesMaster1.xml><?xml version="1.0" encoding="utf-8"?>
 <p:notesMaster xmlns:a="http://schemas.openxmlformats.org/drawingml/2006/main" xmlns:r="http://schemas.openxmlformats.org/officeDocument/2006/relationships" xmlns:p="http://schemas.openxmlformats.org/presentationml/2006/main">
   <p:cSld>
@@ -202,7 +206,7 @@
           <a:p>
             <a:fld id="{1CF91C02-A59E-4778-8D4F-4840DBBEFA68}" type="datetimeFigureOut">
               <a:rPr lang="en-US" smtClean="0"/>
-              <a:t>10/9/2017</a:t>
+              <a:t>10/11/2017</a:t>
             </a:fld>
             <a:endParaRPr lang="en-US"/>
           </a:p>
@@ -532,7 +536,7 @@
             </a:pPr>
             <a:r>
               <a:rPr lang="en-US" dirty="0"/>
-              <a:t>Note that there are date changed for Exam 1 and Assignment 3</a:t>
+              <a:t>Topic? Blade Runner… Who has seen the new version? Why are they called “Blade Runners”? </a:t>
             </a:r>
           </a:p>
           <a:p>
@@ -1159,7 +1163,7 @@
           <a:p>
             <a:fld id="{5FB62F81-FD80-4AA8-93CA-E835B40BE667}" type="datetimeFigureOut">
               <a:rPr lang="en-US" smtClean="0"/>
-              <a:t>10/9/2017</a:t>
+              <a:t>10/11/2017</a:t>
             </a:fld>
             <a:endParaRPr lang="en-US"/>
           </a:p>
@@ -1357,7 +1361,7 @@
           <a:p>
             <a:fld id="{5FB62F81-FD80-4AA8-93CA-E835B40BE667}" type="datetimeFigureOut">
               <a:rPr lang="en-US" smtClean="0"/>
-              <a:t>10/9/2017</a:t>
+              <a:t>10/11/2017</a:t>
             </a:fld>
             <a:endParaRPr lang="en-US"/>
           </a:p>
@@ -1565,7 +1569,7 @@
           <a:p>
             <a:fld id="{5FB62F81-FD80-4AA8-93CA-E835B40BE667}" type="datetimeFigureOut">
               <a:rPr lang="en-US" smtClean="0"/>
-              <a:t>10/9/2017</a:t>
+              <a:t>10/11/2017</a:t>
             </a:fld>
             <a:endParaRPr lang="en-US"/>
           </a:p>
@@ -1763,7 +1767,7 @@
           <a:p>
             <a:fld id="{5FB62F81-FD80-4AA8-93CA-E835B40BE667}" type="datetimeFigureOut">
               <a:rPr lang="en-US" smtClean="0"/>
-              <a:t>10/9/2017</a:t>
+              <a:t>10/11/2017</a:t>
             </a:fld>
             <a:endParaRPr lang="en-US"/>
           </a:p>
@@ -2038,7 +2042,7 @@
           <a:p>
             <a:fld id="{5FB62F81-FD80-4AA8-93CA-E835B40BE667}" type="datetimeFigureOut">
               <a:rPr lang="en-US" smtClean="0"/>
-              <a:t>10/9/2017</a:t>
+              <a:t>10/11/2017</a:t>
             </a:fld>
             <a:endParaRPr lang="en-US"/>
           </a:p>
@@ -2303,7 +2307,7 @@
           <a:p>
             <a:fld id="{5FB62F81-FD80-4AA8-93CA-E835B40BE667}" type="datetimeFigureOut">
               <a:rPr lang="en-US" smtClean="0"/>
-              <a:t>10/9/2017</a:t>
+              <a:t>10/11/2017</a:t>
             </a:fld>
             <a:endParaRPr lang="en-US"/>
           </a:p>
@@ -2715,7 +2719,7 @@
           <a:p>
             <a:fld id="{5FB62F81-FD80-4AA8-93CA-E835B40BE667}" type="datetimeFigureOut">
               <a:rPr lang="en-US" smtClean="0"/>
-              <a:t>10/9/2017</a:t>
+              <a:t>10/11/2017</a:t>
             </a:fld>
             <a:endParaRPr lang="en-US"/>
           </a:p>
@@ -2856,7 +2860,7 @@
           <a:p>
             <a:fld id="{5FB62F81-FD80-4AA8-93CA-E835B40BE667}" type="datetimeFigureOut">
               <a:rPr lang="en-US" smtClean="0"/>
-              <a:t>10/9/2017</a:t>
+              <a:t>10/11/2017</a:t>
             </a:fld>
             <a:endParaRPr lang="en-US"/>
           </a:p>
@@ -2969,7 +2973,7 @@
           <a:p>
             <a:fld id="{5FB62F81-FD80-4AA8-93CA-E835B40BE667}" type="datetimeFigureOut">
               <a:rPr lang="en-US" smtClean="0"/>
-              <a:t>10/9/2017</a:t>
+              <a:t>10/11/2017</a:t>
             </a:fld>
             <a:endParaRPr lang="en-US"/>
           </a:p>
@@ -3280,7 +3284,7 @@
           <a:p>
             <a:fld id="{5FB62F81-FD80-4AA8-93CA-E835B40BE667}" type="datetimeFigureOut">
               <a:rPr lang="en-US" smtClean="0"/>
-              <a:t>10/9/2017</a:t>
+              <a:t>10/11/2017</a:t>
             </a:fld>
             <a:endParaRPr lang="en-US"/>
           </a:p>
@@ -3568,7 +3572,7 @@
           <a:p>
             <a:fld id="{5FB62F81-FD80-4AA8-93CA-E835B40BE667}" type="datetimeFigureOut">
               <a:rPr lang="en-US" smtClean="0"/>
-              <a:t>10/9/2017</a:t>
+              <a:t>10/11/2017</a:t>
             </a:fld>
             <a:endParaRPr lang="en-US"/>
           </a:p>
@@ -3809,7 +3813,7 @@
           <a:p>
             <a:fld id="{5FB62F81-FD80-4AA8-93CA-E835B40BE667}" type="datetimeFigureOut">
               <a:rPr lang="en-US" smtClean="0"/>
-              <a:t>10/9/2017</a:t>
+              <a:t>10/11/2017</a:t>
             </a:fld>
             <a:endParaRPr lang="en-US"/>
           </a:p>
@@ -4270,7 +4274,7 @@
             </a:br>
             <a:r>
               <a:rPr lang="en-US" sz="1800" dirty="0"/>
-              <a:t>Session: 19</a:t>
+              <a:t>Session: 18</a:t>
             </a:r>
           </a:p>
         </p:txBody>

</xml_diff>